<commit_message>
Some changes in Conclusion
</commit_message>
<xml_diff>
--- a/presentation/Unlocking Confirmation Patterns in Indian Railways.pptx
+++ b/presentation/Unlocking Confirmation Patterns in Indian Railways.pptx
@@ -1065,7 +1065,7 @@
         </p:nvSpPr>
         <p:spPr>
           <a:xfrm>
-            <a:off x="381300" y="685800"/>
+            <a:off x="381000" y="685800"/>
             <a:ext cx="6096000" cy="3429000"/>
           </a:xfrm>
           <a:custGeom>
@@ -8492,7 +8492,7 @@
         </p:nvSpPr>
         <p:spPr>
           <a:xfrm>
-            <a:off x="333875" y="494675"/>
+            <a:off x="333875" y="378138"/>
             <a:ext cx="5348100" cy="755700"/>
           </a:xfrm>
           <a:prstGeom prst="rect">
@@ -8501,7 +8501,7 @@
         </p:spPr>
         <p:txBody>
           <a:bodyPr spcFirstLastPara="1" wrap="square" lIns="91425" tIns="91425" rIns="91425" bIns="91425" anchor="t" anchorCtr="0">
-            <a:normAutofit/>
+            <a:normAutofit fontScale="90000"/>
           </a:bodyPr>
           <a:lstStyle/>
           <a:p>
@@ -8515,10 +8515,10 @@
               <a:buNone/>
             </a:pPr>
             <a:r>
-              <a:rPr lang="en" sz="2500"/>
+              <a:rPr lang="en" sz="2500" dirty="0"/>
               <a:t>Traveling Solo Has Its Advantages</a:t>
             </a:r>
-            <a:endParaRPr sz="2500"/>
+            <a:endParaRPr sz="2500" dirty="0"/>
           </a:p>
         </p:txBody>
       </p:sp>
@@ -9257,7 +9257,7 @@
             </a:r>
             <a:r>
               <a:rPr lang="en" dirty="0"/>
-              <a:t> The 'Ladies' quota in 1AC offers the highest probability of confirmation.</a:t>
+              <a:t> The 'Ladies' quota in 2AC offers the highest probability of confirmation.</a:t>
             </a:r>
             <a:br>
               <a:rPr lang="en" dirty="0"/>
@@ -9284,7 +9284,7 @@
             </a:r>
             <a:r>
               <a:rPr lang="en" dirty="0"/>
-              <a:t> Book in 3AC or Sleeper class. Do not opt for premium classes, as your confirmation chances will be significantly lower.</a:t>
+              <a:t> Book in any AC classes, preferably 2AC. Do not opt for sleeper class, as your confirmation chances will be significantly lower.</a:t>
             </a:r>
             <a:br>
               <a:rPr lang="en" dirty="0"/>

</xml_diff>